<commit_message>
Update Phase III Presentation.pptx
</commit_message>
<xml_diff>
--- a/Documentation/Phase III Presentation.pptx
+++ b/Documentation/Phase III Presentation.pptx
@@ -111,6 +111,11 @@
       </a:defRPr>
     </a:lvl9pPr>
   </p:defaultTextStyle>
+  <p:extLst>
+    <p:ext uri="{EFAFB233-063F-42B5-8137-9DF3F51BA10A}">
+      <p15:sldGuideLst xmlns:p15="http://schemas.microsoft.com/office/powerpoint/2012/main"/>
+    </p:ext>
+  </p:extLst>
 </p:presentation>
 </file>
 
@@ -290,7 +295,7 @@
           <a:p>
             <a:fld id="{B1C15A8D-EEB3-4A4A-BC4E-1A9DC776BA70}" type="datetimeFigureOut">
               <a:rPr lang="en-US" smtClean="0"/>
-              <a:t>6/8/2020</a:t>
+              <a:t>13-Jun-20</a:t>
             </a:fld>
             <a:endParaRPr lang="en-US"/>
           </a:p>
@@ -465,7 +470,7 @@
           <a:p>
             <a:fld id="{B1C15A8D-EEB3-4A4A-BC4E-1A9DC776BA70}" type="datetimeFigureOut">
               <a:rPr lang="en-US" smtClean="0"/>
-              <a:t>6/8/2020</a:t>
+              <a:t>13-Jun-20</a:t>
             </a:fld>
             <a:endParaRPr lang="en-US"/>
           </a:p>
@@ -688,7 +693,7 @@
           <a:p>
             <a:fld id="{B1C15A8D-EEB3-4A4A-BC4E-1A9DC776BA70}" type="datetimeFigureOut">
               <a:rPr lang="en-US" smtClean="0"/>
-              <a:t>6/8/2020</a:t>
+              <a:t>13-Jun-20</a:t>
             </a:fld>
             <a:endParaRPr lang="en-US"/>
           </a:p>
@@ -868,7 +873,7 @@
           <a:p>
             <a:fld id="{B1C15A8D-EEB3-4A4A-BC4E-1A9DC776BA70}" type="datetimeFigureOut">
               <a:rPr lang="en-US" smtClean="0"/>
-              <a:t>6/8/2020</a:t>
+              <a:t>13-Jun-20</a:t>
             </a:fld>
             <a:endParaRPr lang="en-US"/>
           </a:p>
@@ -1174,7 +1179,7 @@
           <a:p>
             <a:fld id="{B1C15A8D-EEB3-4A4A-BC4E-1A9DC776BA70}" type="datetimeFigureOut">
               <a:rPr lang="en-US" smtClean="0"/>
-              <a:t>6/8/2020</a:t>
+              <a:t>13-Jun-20</a:t>
             </a:fld>
             <a:endParaRPr lang="en-US"/>
           </a:p>
@@ -1478,7 +1483,7 @@
           <a:p>
             <a:fld id="{B1C15A8D-EEB3-4A4A-BC4E-1A9DC776BA70}" type="datetimeFigureOut">
               <a:rPr lang="en-US" smtClean="0"/>
-              <a:t>6/8/2020</a:t>
+              <a:t>13-Jun-20</a:t>
             </a:fld>
             <a:endParaRPr lang="en-US"/>
           </a:p>
@@ -1900,7 +1905,7 @@
           <a:p>
             <a:fld id="{B1C15A8D-EEB3-4A4A-BC4E-1A9DC776BA70}" type="datetimeFigureOut">
               <a:rPr lang="en-US" smtClean="0"/>
-              <a:t>6/8/2020</a:t>
+              <a:t>13-Jun-20</a:t>
             </a:fld>
             <a:endParaRPr lang="en-US"/>
           </a:p>
@@ -2018,7 +2023,7 @@
           <a:p>
             <a:fld id="{B1C15A8D-EEB3-4A4A-BC4E-1A9DC776BA70}" type="datetimeFigureOut">
               <a:rPr lang="en-US" smtClean="0"/>
-              <a:t>6/8/2020</a:t>
+              <a:t>13-Jun-20</a:t>
             </a:fld>
             <a:endParaRPr lang="en-US"/>
           </a:p>
@@ -2113,7 +2118,7 @@
           <a:p>
             <a:fld id="{B1C15A8D-EEB3-4A4A-BC4E-1A9DC776BA70}" type="datetimeFigureOut">
               <a:rPr lang="en-US" smtClean="0"/>
-              <a:t>6/8/2020</a:t>
+              <a:t>13-Jun-20</a:t>
             </a:fld>
             <a:endParaRPr lang="en-US"/>
           </a:p>
@@ -2391,7 +2396,7 @@
           <a:p>
             <a:fld id="{B1C15A8D-EEB3-4A4A-BC4E-1A9DC776BA70}" type="datetimeFigureOut">
               <a:rPr lang="en-US" smtClean="0"/>
-              <a:t>6/8/2020</a:t>
+              <a:t>13-Jun-20</a:t>
             </a:fld>
             <a:endParaRPr lang="en-US"/>
           </a:p>
@@ -2661,7 +2666,7 @@
           <a:p>
             <a:fld id="{B1C15A8D-EEB3-4A4A-BC4E-1A9DC776BA70}" type="datetimeFigureOut">
               <a:rPr lang="en-US" smtClean="0"/>
-              <a:t>6/8/2020</a:t>
+              <a:t>13-Jun-20</a:t>
             </a:fld>
             <a:endParaRPr lang="en-US"/>
           </a:p>
@@ -2910,7 +2915,7 @@
           <a:p>
             <a:fld id="{B1C15A8D-EEB3-4A4A-BC4E-1A9DC776BA70}" type="datetimeFigureOut">
               <a:rPr lang="en-US" smtClean="0"/>
-              <a:t>6/8/2020</a:t>
+              <a:t>13-Jun-20</a:t>
             </a:fld>
             <a:endParaRPr lang="en-US"/>
           </a:p>
@@ -4096,7 +4101,72 @@
           <a:bodyPr/>
           <a:lstStyle/>
           <a:p>
-            <a:endParaRPr lang="en-US"/>
+            <a:r>
+              <a:rPr lang="en-US" dirty="0" smtClean="0"/>
+              <a:t>In profile page uploading a picture could be any extension </a:t>
+            </a:r>
+            <a:r>
+              <a:rPr lang="en-US" dirty="0" smtClean="0"/>
+              <a:t>.</a:t>
+            </a:r>
+          </a:p>
+          <a:p>
+            <a:r>
+              <a:rPr lang="en-US" dirty="0" smtClean="0"/>
+              <a:t>In profile page defect while editing bank account number.</a:t>
+            </a:r>
+          </a:p>
+          <a:p>
+            <a:r>
+              <a:rPr lang="en-US" dirty="0"/>
+              <a:t>In profile page defect while editing </a:t>
+            </a:r>
+            <a:r>
+              <a:rPr lang="en-US" dirty="0" smtClean="0"/>
+              <a:t>passport number.</a:t>
+            </a:r>
+          </a:p>
+          <a:p>
+            <a:r>
+              <a:rPr lang="en-US" dirty="0"/>
+              <a:t>In profile page defect while editing </a:t>
+            </a:r>
+            <a:r>
+              <a:rPr lang="en-US" dirty="0" smtClean="0"/>
+              <a:t>national id number.</a:t>
+            </a:r>
+          </a:p>
+          <a:p>
+            <a:r>
+              <a:rPr lang="en-US" dirty="0"/>
+              <a:t>In profile page defect while editing </a:t>
+            </a:r>
+            <a:r>
+              <a:rPr lang="en-US" dirty="0" smtClean="0"/>
+              <a:t>mobile number.</a:t>
+            </a:r>
+          </a:p>
+          <a:p>
+            <a:r>
+              <a:rPr lang="en-US" dirty="0"/>
+              <a:t>In profile page </a:t>
+            </a:r>
+            <a:r>
+              <a:rPr lang="en-US" dirty="0" smtClean="0"/>
+              <a:t>validation on negative values.</a:t>
+            </a:r>
+          </a:p>
+          <a:p>
+            <a:pPr marL="0" indent="0">
+              <a:buNone/>
+            </a:pPr>
+            <a:endParaRPr lang="en-US" dirty="0" smtClean="0"/>
+          </a:p>
+          <a:p>
+            <a:pPr marL="0" indent="0">
+              <a:buNone/>
+            </a:pPr>
+            <a:endParaRPr lang="en-US" dirty="0"/>
           </a:p>
         </p:txBody>
       </p:sp>

</xml_diff>